<commit_message>
cap nhat lai abs
</commit_message>
<xml_diff>
--- a/thesis/abs/Đồ án chuyên ngành.pptx
+++ b/thesis/abs/Đồ án chuyên ngành.pptx
@@ -264,7 +264,7 @@
                 <a:latin typeface="Montserrat Light" panose="00000400000000000000" pitchFamily="50" charset="0"/>
                 <a:ea typeface="Microsoft YaHei Light" panose="020B0502040204020203" pitchFamily="34" charset="-122"/>
               </a:rPr>
-              <a:t>2024/1/25</a:t>
+              <a:t>2024/1/29</a:t>
             </a:fld>
             <a:endParaRPr lang="zh-CN" altLang="en-US">
               <a:latin typeface="Montserrat Light" panose="00000400000000000000" pitchFamily="50" charset="0"/>
@@ -447,7 +447,7 @@
           <a:p>
             <a:fld id="{184EC83E-688E-43DA-BB76-712D53DE601D}" type="datetimeFigureOut">
               <a:rPr lang="zh-CN" altLang="en-US" smtClean="0"/>
-              <a:t>2024/1/25</a:t>
+              <a:t>2024/1/29</a:t>
             </a:fld>
             <a:endParaRPr lang="zh-CN" altLang="en-US"/>
           </a:p>
@@ -26858,7 +26858,7 @@
         <p:spPr>
           <a:xfrm>
             <a:off x="1145537" y="3349364"/>
-            <a:ext cx="17142463" cy="5241563"/>
+            <a:ext cx="17142463" cy="5324535"/>
           </a:xfrm>
           <a:prstGeom prst="rect">
             <a:avLst/>
@@ -27924,23 +27924,39 @@
               <a:t> </a:t>
             </a:r>
             <a:r>
-              <a:rPr lang="en-US" sz="3000" dirty="0" err="1">
-                <a:effectLst/>
-                <a:latin typeface="Times New Roman" panose="02020603050405020304" pitchFamily="18" charset="0"/>
-                <a:ea typeface="Times New Roman" panose="02020603050405020304" pitchFamily="18" charset="0"/>
-              </a:rPr>
-              <a:t>bàn</a:t>
-            </a:r>
-            <a:r>
-              <a:rPr lang="en-US" sz="3000" dirty="0">
-                <a:effectLst/>
-                <a:latin typeface="Times New Roman" panose="02020603050405020304" pitchFamily="18" charset="0"/>
-                <a:ea typeface="Times New Roman" panose="02020603050405020304" pitchFamily="18" charset="0"/>
-              </a:rPr>
-              <a:t> </a:t>
-            </a:r>
-            <a:r>
-              <a:rPr lang="en-US" sz="3000" dirty="0" err="1">
+              <a:rPr lang="en-US" sz="3000" dirty="0" err="1" smtClean="0">
+                <a:effectLst/>
+                <a:latin typeface="Times New Roman" panose="02020603050405020304" pitchFamily="18" charset="0"/>
+                <a:ea typeface="Times New Roman" panose="02020603050405020304" pitchFamily="18" charset="0"/>
+              </a:rPr>
+              <a:t>sản</a:t>
+            </a:r>
+            <a:r>
+              <a:rPr lang="en-US" sz="3000" dirty="0" smtClean="0">
+                <a:effectLst/>
+                <a:latin typeface="Times New Roman" panose="02020603050405020304" pitchFamily="18" charset="0"/>
+                <a:ea typeface="Times New Roman" panose="02020603050405020304" pitchFamily="18" charset="0"/>
+              </a:rPr>
+              <a:t> </a:t>
+            </a:r>
+            <a:r>
+              <a:rPr lang="en-US" sz="3000" dirty="0" err="1" smtClean="0">
+                <a:effectLst/>
+                <a:latin typeface="Times New Roman" panose="02020603050405020304" pitchFamily="18" charset="0"/>
+                <a:ea typeface="Times New Roman" panose="02020603050405020304" pitchFamily="18" charset="0"/>
+              </a:rPr>
+              <a:t>phẩm</a:t>
+            </a:r>
+            <a:r>
+              <a:rPr lang="en-US" sz="3000" dirty="0" smtClean="0">
+                <a:effectLst/>
+                <a:latin typeface="Times New Roman" panose="02020603050405020304" pitchFamily="18" charset="0"/>
+                <a:ea typeface="Times New Roman" panose="02020603050405020304" pitchFamily="18" charset="0"/>
+              </a:rPr>
+              <a:t> </a:t>
+            </a:r>
+            <a:r>
+              <a:rPr lang="en-US" sz="3000" dirty="0" err="1" smtClean="0">
                 <a:effectLst/>
                 <a:latin typeface="Times New Roman" panose="02020603050405020304" pitchFamily="18" charset="0"/>
                 <a:ea typeface="Times New Roman" panose="02020603050405020304" pitchFamily="18" charset="0"/>
@@ -27948,13 +27964,50 @@
               <a:t>đã</a:t>
             </a:r>
             <a:r>
-              <a:rPr lang="en-US" sz="3000" dirty="0">
-                <a:effectLst/>
-                <a:latin typeface="Times New Roman" panose="02020603050405020304" pitchFamily="18" charset="0"/>
-                <a:ea typeface="Times New Roman" panose="02020603050405020304" pitchFamily="18" charset="0"/>
-              </a:rPr>
-              <a:t> full.</a:t>
-            </a:r>
+              <a:rPr lang="en-US" sz="3000" dirty="0" smtClean="0">
+                <a:effectLst/>
+                <a:latin typeface="Times New Roman" panose="02020603050405020304" pitchFamily="18" charset="0"/>
+                <a:ea typeface="Times New Roman" panose="02020603050405020304" pitchFamily="18" charset="0"/>
+              </a:rPr>
+              <a:t> </a:t>
+            </a:r>
+            <a:r>
+              <a:rPr lang="en-US" sz="3000" dirty="0" err="1" smtClean="0">
+                <a:effectLst/>
+                <a:latin typeface="Times New Roman" panose="02020603050405020304" pitchFamily="18" charset="0"/>
+                <a:ea typeface="Times New Roman" panose="02020603050405020304" pitchFamily="18" charset="0"/>
+              </a:rPr>
+              <a:t>hết</a:t>
+            </a:r>
+            <a:r>
+              <a:rPr lang="en-US" sz="3000" dirty="0" smtClean="0">
+                <a:effectLst/>
+                <a:latin typeface="Times New Roman" panose="02020603050405020304" pitchFamily="18" charset="0"/>
+                <a:ea typeface="Times New Roman" panose="02020603050405020304" pitchFamily="18" charset="0"/>
+              </a:rPr>
+              <a:t> </a:t>
+            </a:r>
+            <a:r>
+              <a:rPr lang="en-US" sz="3000" dirty="0" err="1" smtClean="0">
+                <a:effectLst/>
+                <a:latin typeface="Times New Roman" panose="02020603050405020304" pitchFamily="18" charset="0"/>
+                <a:ea typeface="Times New Roman" panose="02020603050405020304" pitchFamily="18" charset="0"/>
+              </a:rPr>
+              <a:t>hàng</a:t>
+            </a:r>
+            <a:r>
+              <a:rPr lang="en-US" sz="3000" dirty="0" smtClean="0">
+                <a:effectLst/>
+                <a:latin typeface="Times New Roman" panose="02020603050405020304" pitchFamily="18" charset="0"/>
+                <a:ea typeface="Times New Roman" panose="02020603050405020304" pitchFamily="18" charset="0"/>
+              </a:rPr>
+              <a:t>.</a:t>
+            </a:r>
+            <a:endParaRPr lang="en-US" sz="3000" dirty="0">
+              <a:effectLst/>
+              <a:latin typeface="Times New Roman" panose="02020603050405020304" pitchFamily="18" charset="0"/>
+              <a:ea typeface="Times New Roman" panose="02020603050405020304" pitchFamily="18" charset="0"/>
+            </a:endParaRPr>
           </a:p>
           <a:p>
             <a:pPr marL="457200" indent="-457200" algn="just">
@@ -28016,39 +28069,39 @@
               <a:t> </a:t>
             </a:r>
             <a:r>
-              <a:rPr lang="en-US" sz="3000" dirty="0" err="1">
-                <a:effectLst/>
-                <a:latin typeface="Times New Roman" panose="02020603050405020304" pitchFamily="18" charset="0"/>
-                <a:ea typeface="Times New Roman" panose="02020603050405020304" pitchFamily="18" charset="0"/>
-              </a:rPr>
-              <a:t>thành</a:t>
-            </a:r>
-            <a:r>
-              <a:rPr lang="en-US" sz="3000" dirty="0">
-                <a:effectLst/>
-                <a:latin typeface="Times New Roman" panose="02020603050405020304" pitchFamily="18" charset="0"/>
-                <a:ea typeface="Times New Roman" panose="02020603050405020304" pitchFamily="18" charset="0"/>
-              </a:rPr>
-              <a:t> </a:t>
-            </a:r>
-            <a:r>
-              <a:rPr lang="en-US" sz="3000" dirty="0" err="1">
-                <a:effectLst/>
-                <a:latin typeface="Times New Roman" panose="02020603050405020304" pitchFamily="18" charset="0"/>
-                <a:ea typeface="Times New Roman" panose="02020603050405020304" pitchFamily="18" charset="0"/>
-              </a:rPr>
-              <a:t>viên</a:t>
-            </a:r>
-            <a:r>
-              <a:rPr lang="en-US" sz="3000" dirty="0">
-                <a:effectLst/>
-                <a:latin typeface="Times New Roman" panose="02020603050405020304" pitchFamily="18" charset="0"/>
-                <a:ea typeface="Times New Roman" panose="02020603050405020304" pitchFamily="18" charset="0"/>
-              </a:rPr>
-              <a:t> </a:t>
-            </a:r>
-            <a:r>
-              <a:rPr lang="en-US" sz="3000" dirty="0" err="1">
+              <a:rPr lang="en-US" sz="3000" dirty="0" err="1" smtClean="0">
+                <a:effectLst/>
+                <a:latin typeface="Times New Roman" panose="02020603050405020304" pitchFamily="18" charset="0"/>
+                <a:ea typeface="Times New Roman" panose="02020603050405020304" pitchFamily="18" charset="0"/>
+              </a:rPr>
+              <a:t>khách</a:t>
+            </a:r>
+            <a:r>
+              <a:rPr lang="en-US" sz="3000" dirty="0" smtClean="0">
+                <a:effectLst/>
+                <a:latin typeface="Times New Roman" panose="02020603050405020304" pitchFamily="18" charset="0"/>
+                <a:ea typeface="Times New Roman" panose="02020603050405020304" pitchFamily="18" charset="0"/>
+              </a:rPr>
+              <a:t> </a:t>
+            </a:r>
+            <a:r>
+              <a:rPr lang="en-US" sz="3000" dirty="0" err="1" smtClean="0">
+                <a:effectLst/>
+                <a:latin typeface="Times New Roman" panose="02020603050405020304" pitchFamily="18" charset="0"/>
+                <a:ea typeface="Times New Roman" panose="02020603050405020304" pitchFamily="18" charset="0"/>
+              </a:rPr>
+              <a:t>hàng</a:t>
+            </a:r>
+            <a:r>
+              <a:rPr lang="en-US" sz="3000" dirty="0" smtClean="0">
+                <a:effectLst/>
+                <a:latin typeface="Times New Roman" panose="02020603050405020304" pitchFamily="18" charset="0"/>
+                <a:ea typeface="Times New Roman" panose="02020603050405020304" pitchFamily="18" charset="0"/>
+              </a:rPr>
+              <a:t> </a:t>
+            </a:r>
+            <a:r>
+              <a:rPr lang="en-US" sz="3000" dirty="0" err="1" smtClean="0">
                 <a:effectLst/>
                 <a:latin typeface="Times New Roman" panose="02020603050405020304" pitchFamily="18" charset="0"/>
                 <a:ea typeface="Times New Roman" panose="02020603050405020304" pitchFamily="18" charset="0"/>
@@ -28056,7 +28109,7 @@
               <a:t>vip</a:t>
             </a:r>
             <a:r>
-              <a:rPr lang="en-US" sz="3000" dirty="0">
+              <a:rPr lang="en-US" sz="3000" dirty="0" smtClean="0">
                 <a:effectLst/>
                 <a:latin typeface="Times New Roman" panose="02020603050405020304" pitchFamily="18" charset="0"/>
                 <a:ea typeface="Times New Roman" panose="02020603050405020304" pitchFamily="18" charset="0"/>
@@ -39018,7 +39071,7 @@
       </p:sp>
       <p:pic>
         <p:nvPicPr>
-          <p:cNvPr id="9" name="Picture Placeholder 8" descr="A picture containing map&#10;&#10;Description automatically generated"/>
+          <p:cNvPr id="7" name="Picture Placeholder 6"/>
           <p:cNvPicPr>
             <a:picLocks noGrp="1" noChangeAspect="1"/>
           </p:cNvPicPr>
@@ -39027,24 +39080,19 @@
           </p:nvPr>
         </p:nvPicPr>
         <p:blipFill>
-          <a:blip r:embed="rId3">
+          <a:blip r:embed="rId3" cstate="print">
             <a:extLst>
               <a:ext uri="{28A0092B-C50C-407E-A947-70E740481C1C}">
                 <a14:useLocalDpi xmlns:a14="http://schemas.microsoft.com/office/drawing/2010/main" val="0"/>
               </a:ext>
             </a:extLst>
           </a:blip>
-          <a:srcRect l="18168" r="18168"/>
+          <a:srcRect l="12491" r="12491"/>
           <a:stretch>
             <a:fillRect/>
           </a:stretch>
         </p:blipFill>
-        <p:spPr>
-          <a:xfrm>
-            <a:off x="2248791" y="1875713"/>
-            <a:ext cx="6535574" cy="6535574"/>
-          </a:xfrm>
-        </p:spPr>
+        <p:spPr/>
       </p:pic>
     </p:spTree>
   </p:cSld>
@@ -41284,6 +41332,47 @@
           </a:p>
         </p:txBody>
       </p:sp>
+      <p:pic>
+        <p:nvPicPr>
+          <p:cNvPr id="1026" name="Picture 2" descr="Phụ tùng xe máy hiện nay, TOP 5 thông tin cần biết"/>
+          <p:cNvPicPr>
+            <a:picLocks noChangeAspect="1" noChangeArrowheads="1"/>
+          </p:cNvPicPr>
+          <p:nvPr/>
+        </p:nvPicPr>
+        <p:blipFill>
+          <a:blip r:embed="rId2">
+            <a:extLst>
+              <a:ext uri="{28A0092B-C50C-407E-A947-70E740481C1C}">
+                <a14:useLocalDpi xmlns:a14="http://schemas.microsoft.com/office/drawing/2010/main" val="0"/>
+              </a:ext>
+            </a:extLst>
+          </a:blip>
+          <a:srcRect/>
+          <a:stretch>
+            <a:fillRect/>
+          </a:stretch>
+        </p:blipFill>
+        <p:spPr bwMode="auto">
+          <a:xfrm>
+            <a:off x="331578" y="4020814"/>
+            <a:ext cx="5466771" cy="4314194"/>
+          </a:xfrm>
+          <a:prstGeom prst="rect">
+            <a:avLst/>
+          </a:prstGeom>
+          <a:noFill/>
+          <a:extLst>
+            <a:ext uri="{909E8E84-426E-40DD-AFC4-6F175D3DCCD1}">
+              <a14:hiddenFill xmlns:a14="http://schemas.microsoft.com/office/drawing/2010/main">
+                <a:solidFill>
+                  <a:srgbClr val="FFFFFF"/>
+                </a:solidFill>
+              </a14:hiddenFill>
+            </a:ext>
+          </a:extLst>
+        </p:spPr>
+      </p:pic>
     </p:spTree>
   </p:cSld>
   <p:clrMapOvr>

</xml_diff>